<commit_message>
updates to online materials
</commit_message>
<xml_diff>
--- a/Introduction to Python Online.pptx
+++ b/Introduction to Python Online.pptx
@@ -3377,8 +3377,13 @@
           <a:p>
             <a:r>
               <a:rPr lang="en-US" dirty="0"/>
-              <a:t>Introduction to Python Online</a:t>
-            </a:r>
+              <a:t>Introduction </a:t>
+            </a:r>
+            <a:r>
+              <a:rPr lang="en-US"/>
+              <a:t>to Python</a:t>
+            </a:r>
+            <a:endParaRPr lang="en-US" dirty="0"/>
           </a:p>
         </p:txBody>
       </p:sp>
@@ -4590,13 +4595,7 @@
               <a:rPr lang="en-US" sz="4000" dirty="0">
                 <a:hlinkClick r:id="rId2"/>
               </a:rPr>
-              <a:t>h</a:t>
-            </a:r>
-            <a:r>
-              <a:rPr lang="en-US" sz="4000" dirty="0">
-                <a:hlinkClick r:id="rId2"/>
-              </a:rPr>
-              <a:t>ttps://github.com/mike-babb/intro_to_python</a:t>
+              <a:t>https://github.com/mike-babb/intro_to_python</a:t>
             </a:r>
             <a:endParaRPr lang="en-US" sz="4000" dirty="0"/>
           </a:p>
@@ -5339,10 +5338,10 @@
       </p:sp>
       <p:pic>
         <p:nvPicPr>
-          <p:cNvPr id="9" name="Picture 8">
+          <p:cNvPr id="4" name="Picture 3">
             <a:extLst>
               <a:ext uri="{FF2B5EF4-FFF2-40B4-BE49-F238E27FC236}">
-                <a16:creationId xmlns:a16="http://schemas.microsoft.com/office/drawing/2014/main" id="{973E88EA-7112-4120-A114-757AD3FD67AC}"/>
+                <a16:creationId xmlns:a16="http://schemas.microsoft.com/office/drawing/2014/main" id="{CF750074-51A7-4E0C-8147-BA22BA579271}"/>
               </a:ext>
             </a:extLst>
           </p:cNvPr>
@@ -5359,8 +5358,8 @@
         </p:blipFill>
         <p:spPr>
           <a:xfrm>
-            <a:off x="661642" y="970779"/>
-            <a:ext cx="10868716" cy="5887221"/>
+            <a:off x="731520" y="918437"/>
+            <a:ext cx="10728960" cy="5811520"/>
           </a:xfrm>
           <a:prstGeom prst="rect">
             <a:avLst/>

</xml_diff>

<commit_message>
Updates to online version
</commit_message>
<xml_diff>
--- a/Introduction to Python Online.pptx
+++ b/Introduction to Python Online.pptx
@@ -5,7 +5,7 @@
     <p:sldMasterId id="2147483660" r:id="rId1"/>
   </p:sldMasterIdLst>
   <p:notesMasterIdLst>
-    <p:notesMasterId r:id="rId23"/>
+    <p:notesMasterId r:id="rId24"/>
   </p:notesMasterIdLst>
   <p:sldIdLst>
     <p:sldId id="256" r:id="rId2"/>
@@ -15,20 +15,21 @@
     <p:sldId id="287" r:id="rId6"/>
     <p:sldId id="288" r:id="rId7"/>
     <p:sldId id="289" r:id="rId8"/>
-    <p:sldId id="281" r:id="rId9"/>
-    <p:sldId id="264" r:id="rId10"/>
-    <p:sldId id="270" r:id="rId11"/>
-    <p:sldId id="272" r:id="rId12"/>
-    <p:sldId id="278" r:id="rId13"/>
-    <p:sldId id="265" r:id="rId14"/>
-    <p:sldId id="267" r:id="rId15"/>
-    <p:sldId id="273" r:id="rId16"/>
-    <p:sldId id="271" r:id="rId17"/>
-    <p:sldId id="260" r:id="rId18"/>
-    <p:sldId id="261" r:id="rId19"/>
-    <p:sldId id="276" r:id="rId20"/>
-    <p:sldId id="277" r:id="rId21"/>
-    <p:sldId id="258" r:id="rId22"/>
+    <p:sldId id="271" r:id="rId9"/>
+    <p:sldId id="290" r:id="rId10"/>
+    <p:sldId id="281" r:id="rId11"/>
+    <p:sldId id="264" r:id="rId12"/>
+    <p:sldId id="270" r:id="rId13"/>
+    <p:sldId id="272" r:id="rId14"/>
+    <p:sldId id="278" r:id="rId15"/>
+    <p:sldId id="265" r:id="rId16"/>
+    <p:sldId id="267" r:id="rId17"/>
+    <p:sldId id="273" r:id="rId18"/>
+    <p:sldId id="260" r:id="rId19"/>
+    <p:sldId id="261" r:id="rId20"/>
+    <p:sldId id="276" r:id="rId21"/>
+    <p:sldId id="277" r:id="rId22"/>
+    <p:sldId id="258" r:id="rId23"/>
   </p:sldIdLst>
   <p:sldSz cx="12192000" cy="6858000"/>
   <p:notesSz cx="6858000" cy="9144000"/>
@@ -228,7 +229,7 @@
           <a:p>
             <a:fld id="{1625BD86-A277-4756-AFD6-158CB1C0F478}" type="datetimeFigureOut">
               <a:rPr lang="en-US" smtClean="0"/>
-              <a:t>2/3/2021</a:t>
+              <a:t>2/4/2021</a:t>
             </a:fld>
             <a:endParaRPr lang="en-US" dirty="0"/>
           </a:p>
@@ -626,7 +627,7 @@
           <a:p>
             <a:fld id="{456B5467-EA77-4FF9-8BC4-2EA8FCAB53DA}" type="datetimeFigureOut">
               <a:rPr lang="en-US" smtClean="0"/>
-              <a:t>2/3/2021</a:t>
+              <a:t>2/4/2021</a:t>
             </a:fld>
             <a:endParaRPr lang="en-US" dirty="0"/>
           </a:p>
@@ -796,7 +797,7 @@
           <a:p>
             <a:fld id="{456B5467-EA77-4FF9-8BC4-2EA8FCAB53DA}" type="datetimeFigureOut">
               <a:rPr lang="en-US" smtClean="0"/>
-              <a:t>2/3/2021</a:t>
+              <a:t>2/4/2021</a:t>
             </a:fld>
             <a:endParaRPr lang="en-US" dirty="0"/>
           </a:p>
@@ -976,7 +977,7 @@
           <a:p>
             <a:fld id="{456B5467-EA77-4FF9-8BC4-2EA8FCAB53DA}" type="datetimeFigureOut">
               <a:rPr lang="en-US" smtClean="0"/>
-              <a:t>2/3/2021</a:t>
+              <a:t>2/4/2021</a:t>
             </a:fld>
             <a:endParaRPr lang="en-US" dirty="0"/>
           </a:p>
@@ -1146,7 +1147,7 @@
           <a:p>
             <a:fld id="{456B5467-EA77-4FF9-8BC4-2EA8FCAB53DA}" type="datetimeFigureOut">
               <a:rPr lang="en-US" smtClean="0"/>
-              <a:t>2/3/2021</a:t>
+              <a:t>2/4/2021</a:t>
             </a:fld>
             <a:endParaRPr lang="en-US" dirty="0"/>
           </a:p>
@@ -1392,7 +1393,7 @@
           <a:p>
             <a:fld id="{456B5467-EA77-4FF9-8BC4-2EA8FCAB53DA}" type="datetimeFigureOut">
               <a:rPr lang="en-US" smtClean="0"/>
-              <a:t>2/3/2021</a:t>
+              <a:t>2/4/2021</a:t>
             </a:fld>
             <a:endParaRPr lang="en-US" dirty="0"/>
           </a:p>
@@ -1624,7 +1625,7 @@
           <a:p>
             <a:fld id="{456B5467-EA77-4FF9-8BC4-2EA8FCAB53DA}" type="datetimeFigureOut">
               <a:rPr lang="en-US" smtClean="0"/>
-              <a:t>2/3/2021</a:t>
+              <a:t>2/4/2021</a:t>
             </a:fld>
             <a:endParaRPr lang="en-US" dirty="0"/>
           </a:p>
@@ -1991,7 +1992,7 @@
           <a:p>
             <a:fld id="{456B5467-EA77-4FF9-8BC4-2EA8FCAB53DA}" type="datetimeFigureOut">
               <a:rPr lang="en-US" smtClean="0"/>
-              <a:t>2/3/2021</a:t>
+              <a:t>2/4/2021</a:t>
             </a:fld>
             <a:endParaRPr lang="en-US" dirty="0"/>
           </a:p>
@@ -2109,7 +2110,7 @@
           <a:p>
             <a:fld id="{456B5467-EA77-4FF9-8BC4-2EA8FCAB53DA}" type="datetimeFigureOut">
               <a:rPr lang="en-US" smtClean="0"/>
-              <a:t>2/3/2021</a:t>
+              <a:t>2/4/2021</a:t>
             </a:fld>
             <a:endParaRPr lang="en-US" dirty="0"/>
           </a:p>
@@ -2204,7 +2205,7 @@
           <a:p>
             <a:fld id="{456B5467-EA77-4FF9-8BC4-2EA8FCAB53DA}" type="datetimeFigureOut">
               <a:rPr lang="en-US" smtClean="0"/>
-              <a:t>2/3/2021</a:t>
+              <a:t>2/4/2021</a:t>
             </a:fld>
             <a:endParaRPr lang="en-US" dirty="0"/>
           </a:p>
@@ -2481,7 +2482,7 @@
           <a:p>
             <a:fld id="{456B5467-EA77-4FF9-8BC4-2EA8FCAB53DA}" type="datetimeFigureOut">
               <a:rPr lang="en-US" smtClean="0"/>
-              <a:t>2/3/2021</a:t>
+              <a:t>2/4/2021</a:t>
             </a:fld>
             <a:endParaRPr lang="en-US" dirty="0"/>
           </a:p>
@@ -2737,7 +2738,7 @@
           <a:p>
             <a:fld id="{456B5467-EA77-4FF9-8BC4-2EA8FCAB53DA}" type="datetimeFigureOut">
               <a:rPr lang="en-US" smtClean="0"/>
-              <a:t>2/3/2021</a:t>
+              <a:t>2/4/2021</a:t>
             </a:fld>
             <a:endParaRPr lang="en-US" dirty="0"/>
           </a:p>
@@ -2950,7 +2951,7 @@
           <a:p>
             <a:fld id="{456B5467-EA77-4FF9-8BC4-2EA8FCAB53DA}" type="datetimeFigureOut">
               <a:rPr lang="en-US" smtClean="0"/>
-              <a:t>2/3/2021</a:t>
+              <a:t>2/4/2021</a:t>
             </a:fld>
             <a:endParaRPr lang="en-US" dirty="0"/>
           </a:p>
@@ -3496,7 +3497,13 @@
       </p:grpSpPr>
       <p:sp>
         <p:nvSpPr>
-          <p:cNvPr id="2" name="Title 1"/>
+          <p:cNvPr id="4" name="Title 3">
+            <a:extLst>
+              <a:ext uri="{FF2B5EF4-FFF2-40B4-BE49-F238E27FC236}">
+                <a16:creationId xmlns:a16="http://schemas.microsoft.com/office/drawing/2014/main" id="{05A97637-9CEC-4111-86FC-9B81BD1CB508}"/>
+              </a:ext>
+            </a:extLst>
+          </p:cNvPr>
           <p:cNvSpPr>
             <a:spLocks noGrp="1"/>
           </p:cNvSpPr>
@@ -3511,84 +3518,40 @@
           <a:p>
             <a:r>
               <a:rPr lang="en-US" dirty="0"/>
-              <a:t>About Python</a:t>
-            </a:r>
-          </a:p>
-        </p:txBody>
-      </p:sp>
-      <p:sp>
-        <p:nvSpPr>
-          <p:cNvPr id="3" name="Content Placeholder 2"/>
-          <p:cNvSpPr>
-            <a:spLocks noGrp="1"/>
-          </p:cNvSpPr>
-          <p:nvPr>
-            <p:ph idx="1"/>
-          </p:nvPr>
-        </p:nvSpPr>
-        <p:spPr/>
-        <p:txBody>
-          <a:bodyPr/>
-          <a:lstStyle/>
-          <a:p>
-            <a:r>
-              <a:rPr lang="en-US" dirty="0"/>
-              <a:t>Developed by Guido van Rossum in the early 90s. Current versions: Python 3.7.x and Python 2.7.x</a:t>
-            </a:r>
-          </a:p>
-          <a:p>
-            <a:r>
-              <a:rPr lang="en-US" dirty="0"/>
-              <a:t>Python 3.7.x is van Rossum’s (and the larger community’s) attempt at fixing some core issues with python 2.x</a:t>
-            </a:r>
-          </a:p>
-          <a:p>
-            <a:pPr lvl="1"/>
-            <a:r>
-              <a:rPr lang="en-US" dirty="0"/>
-              <a:t>Integer division returns floats (5 / 2 = 2.5 instead of 5/2 = 2)</a:t>
-            </a:r>
-          </a:p>
-          <a:p>
-            <a:pPr lvl="1"/>
-            <a:r>
-              <a:rPr lang="en-US" dirty="0"/>
-              <a:t>Better handling of strings</a:t>
-            </a:r>
-          </a:p>
-          <a:p>
-            <a:pPr lvl="1"/>
-            <a:r>
-              <a:rPr lang="en-US" dirty="0"/>
-              <a:t>Better memory management in some cases</a:t>
-            </a:r>
-          </a:p>
-          <a:p>
-            <a:pPr lvl="1"/>
-            <a:r>
-              <a:rPr lang="en-US" dirty="0"/>
-              <a:t>It’s a bit faster in general: </a:t>
-            </a:r>
-            <a:r>
-              <a:rPr lang="en-US" dirty="0">
-                <a:hlinkClick r:id="rId2"/>
-              </a:rPr>
-              <a:t>https://hackernoon.com/which-is-the-fastest-version-of-python-2ae7c61a6b2b</a:t>
-            </a:r>
-            <a:endParaRPr lang="en-US" dirty="0"/>
-          </a:p>
-          <a:p>
-            <a:pPr marL="457200" lvl="1" indent="0">
-              <a:buNone/>
-            </a:pPr>
-            <a:endParaRPr lang="en-US" dirty="0"/>
+              <a:t>Python and Workshop Information</a:t>
+            </a:r>
+          </a:p>
+        </p:txBody>
+      </p:sp>
+      <p:sp>
+        <p:nvSpPr>
+          <p:cNvPr id="5" name="Text Placeholder 4">
+            <a:extLst>
+              <a:ext uri="{FF2B5EF4-FFF2-40B4-BE49-F238E27FC236}">
+                <a16:creationId xmlns:a16="http://schemas.microsoft.com/office/drawing/2014/main" id="{65C3CD85-523D-412C-A211-656CC3C9964E}"/>
+              </a:ext>
+            </a:extLst>
+          </p:cNvPr>
+          <p:cNvSpPr>
+            <a:spLocks noGrp="1"/>
+          </p:cNvSpPr>
+          <p:nvPr>
+            <p:ph type="body" idx="1"/>
+          </p:nvPr>
+        </p:nvSpPr>
+        <p:spPr/>
+        <p:txBody>
+          <a:bodyPr/>
+          <a:lstStyle/>
+          <a:p>
+            <a:endParaRPr lang="en-US"/>
           </a:p>
         </p:txBody>
       </p:sp>
     </p:spTree>
     <p:extLst>
       <p:ext uri="{BB962C8B-B14F-4D97-AF65-F5344CB8AC3E}">
-        <p14:creationId xmlns:p14="http://schemas.microsoft.com/office/powerpoint/2010/main" val="3428809214"/>
+        <p14:creationId xmlns:p14="http://schemas.microsoft.com/office/powerpoint/2010/main" val="2746606654"/>
       </p:ext>
     </p:extLst>
   </p:cSld>
@@ -3632,73 +3595,133 @@
           <a:p>
             <a:r>
               <a:rPr lang="en-US" dirty="0"/>
-              <a:t>Pandas – Python Data Analysis Library</a:t>
-            </a:r>
-          </a:p>
-        </p:txBody>
-      </p:sp>
-      <p:pic>
-        <p:nvPicPr>
-          <p:cNvPr id="3" name="Picture 2"/>
-          <p:cNvPicPr>
-            <a:picLocks noChangeAspect="1"/>
-          </p:cNvPicPr>
-          <p:nvPr/>
-        </p:nvPicPr>
-        <p:blipFill rotWithShape="1">
-          <a:blip r:embed="rId2"/>
-          <a:srcRect l="3548"/>
-          <a:stretch/>
-        </p:blipFill>
-        <p:spPr>
-          <a:xfrm>
-            <a:off x="923544" y="1591056"/>
-            <a:ext cx="7291922" cy="4806505"/>
-          </a:xfrm>
-          <a:prstGeom prst="rect">
-            <a:avLst/>
-          </a:prstGeom>
-        </p:spPr>
-      </p:pic>
-      <p:sp>
-        <p:nvSpPr>
-          <p:cNvPr id="4" name="TextBox 3"/>
-          <p:cNvSpPr txBox="1"/>
-          <p:nvPr/>
-        </p:nvSpPr>
-        <p:spPr>
-          <a:xfrm>
-            <a:off x="8300810" y="1591056"/>
-            <a:ext cx="3447288" cy="369332"/>
-          </a:xfrm>
-          <a:prstGeom prst="rect">
-            <a:avLst/>
-          </a:prstGeom>
-          <a:noFill/>
-        </p:spPr>
-        <p:txBody>
-          <a:bodyPr wrap="square" rtlCol="0">
-            <a:spAutoFit/>
+              <a:t>Why python?</a:t>
+            </a:r>
+          </a:p>
+        </p:txBody>
+      </p:sp>
+      <p:sp>
+        <p:nvSpPr>
+          <p:cNvPr id="3" name="Content Placeholder 2"/>
+          <p:cNvSpPr>
+            <a:spLocks noGrp="1"/>
+          </p:cNvSpPr>
+          <p:nvPr>
+            <p:ph idx="1"/>
+          </p:nvPr>
+        </p:nvSpPr>
+        <p:spPr/>
+        <p:txBody>
+          <a:bodyPr>
+            <a:normAutofit fontScale="92500" lnSpcReduction="20000"/>
           </a:bodyPr>
           <a:lstStyle/>
           <a:p>
+            <a:pPr>
+              <a:buFont typeface="Arial" panose="020B0604020202020204" pitchFamily="34" charset="0"/>
+              <a:buChar char="•"/>
+            </a:pPr>
+            <a:r>
+              <a:rPr lang="en-US" dirty="0"/>
+              <a:t>It’s easy to jump in: </a:t>
+            </a:r>
+            <a:r>
+              <a:rPr lang="en-US" dirty="0">
+                <a:hlinkClick r:id="rId2"/>
+              </a:rPr>
+              <a:t>https://www.python.org/about/gettingstarted/</a:t>
+            </a:r>
+            <a:endParaRPr lang="en-US" dirty="0"/>
+          </a:p>
+          <a:p>
+            <a:pPr>
+              <a:buFont typeface="Arial" panose="020B0604020202020204" pitchFamily="34" charset="0"/>
+              <a:buChar char="•"/>
+            </a:pPr>
+            <a:r>
+              <a:rPr lang="en-US" dirty="0"/>
+              <a:t>It’s cross-platform: Windows, Mac, Linux</a:t>
+            </a:r>
+          </a:p>
+          <a:p>
+            <a:pPr>
+              <a:buFont typeface="Arial" panose="020B0604020202020204" pitchFamily="34" charset="0"/>
+              <a:buChar char="•"/>
+            </a:pPr>
+            <a:r>
+              <a:rPr lang="en-US" dirty="0"/>
+              <a:t>It was designed to be simple and readable: </a:t>
+            </a:r>
             <a:r>
               <a:rPr lang="en-US" dirty="0">
                 <a:hlinkClick r:id="rId3"/>
               </a:rPr>
-              <a:t>https://pandas.pydata.org/</a:t>
-            </a:r>
-            <a:r>
-              <a:rPr lang="en-US" dirty="0"/>
-              <a:t> </a:t>
-            </a:r>
+              <a:t>https://xkcd.com/353/</a:t>
+            </a:r>
+            <a:endParaRPr lang="en-US" dirty="0"/>
+          </a:p>
+          <a:p>
+            <a:r>
+              <a:rPr lang="en-US" dirty="0"/>
+              <a:t>It’s free and open source</a:t>
+            </a:r>
+          </a:p>
+          <a:p>
+            <a:r>
+              <a:rPr lang="en-US" dirty="0"/>
+              <a:t>It’s popular: </a:t>
+            </a:r>
+            <a:r>
+              <a:rPr lang="en-US" dirty="0">
+                <a:hlinkClick r:id="rId4"/>
+              </a:rPr>
+              <a:t>https://www.tiobe.com/tiobe-index/python/</a:t>
+            </a:r>
+            <a:endParaRPr lang="en-US" dirty="0"/>
+          </a:p>
+          <a:p>
+            <a:pPr>
+              <a:buFont typeface="Arial" panose="020B0604020202020204" pitchFamily="34" charset="0"/>
+              <a:buChar char="•"/>
+            </a:pPr>
+            <a:r>
+              <a:rPr lang="en-US" dirty="0"/>
+              <a:t>It’s prolific: used in many industries for many jobs. Finance, real estate tech, server administration, health care research, non-profit administration</a:t>
+            </a:r>
+          </a:p>
+          <a:p>
+            <a:pPr>
+              <a:buFont typeface="Arial" panose="020B0604020202020204" pitchFamily="34" charset="0"/>
+              <a:buChar char="•"/>
+            </a:pPr>
+            <a:r>
+              <a:rPr lang="en-US" dirty="0"/>
+              <a:t>And departments across campus: sociology, economics, civil engineering, astronomy (and geography!)</a:t>
+            </a:r>
+          </a:p>
+          <a:p>
+            <a:pPr>
+              <a:buFont typeface="Arial" panose="020B0604020202020204" pitchFamily="34" charset="0"/>
+              <a:buChar char="•"/>
+            </a:pPr>
+            <a:r>
+              <a:rPr lang="en-US" dirty="0"/>
+              <a:t>Many libraries that do pretty much what you want with just a few commands</a:t>
+            </a:r>
+          </a:p>
+          <a:p>
+            <a:pPr>
+              <a:buFont typeface="Arial" panose="020B0604020202020204" pitchFamily="34" charset="0"/>
+              <a:buChar char="•"/>
+            </a:pPr>
+            <a:endParaRPr lang="en-US" dirty="0"/>
           </a:p>
         </p:txBody>
       </p:sp>
     </p:spTree>
     <p:extLst>
       <p:ext uri="{BB962C8B-B14F-4D97-AF65-F5344CB8AC3E}">
-        <p14:creationId xmlns:p14="http://schemas.microsoft.com/office/powerpoint/2010/main" val="2298993283"/>
+        <p14:creationId xmlns:p14="http://schemas.microsoft.com/office/powerpoint/2010/main" val="3321498620"/>
       </p:ext>
     </p:extLst>
   </p:cSld>
@@ -3727,13 +3750,7 @@
       </p:grpSpPr>
       <p:sp>
         <p:nvSpPr>
-          <p:cNvPr id="2" name="Title 1">
-            <a:extLst>
-              <a:ext uri="{FF2B5EF4-FFF2-40B4-BE49-F238E27FC236}">
-                <a16:creationId xmlns:a16="http://schemas.microsoft.com/office/drawing/2014/main" id="{12446907-52E0-49D5-B8B9-955CD4977F3D}"/>
-              </a:ext>
-            </a:extLst>
-          </p:cNvPr>
+          <p:cNvPr id="2" name="Title 1"/>
           <p:cNvSpPr>
             <a:spLocks noGrp="1"/>
           </p:cNvSpPr>
@@ -3748,40 +3765,76 @@
           <a:p>
             <a:r>
               <a:rPr lang="en-US" dirty="0"/>
-              <a:t>Using </a:t>
-            </a:r>
-            <a:r>
-              <a:rPr lang="en-US" dirty="0" err="1"/>
-              <a:t>Jupyter</a:t>
-            </a:r>
-            <a:r>
-              <a:rPr lang="en-US" dirty="0"/>
-              <a:t> on the Desktop</a:t>
-            </a:r>
-          </a:p>
-        </p:txBody>
-      </p:sp>
-      <p:sp>
-        <p:nvSpPr>
-          <p:cNvPr id="3" name="Text Placeholder 2">
-            <a:extLst>
-              <a:ext uri="{FF2B5EF4-FFF2-40B4-BE49-F238E27FC236}">
-                <a16:creationId xmlns:a16="http://schemas.microsoft.com/office/drawing/2014/main" id="{7101EC71-A9CD-4281-9AA0-06F74DD89E88}"/>
-              </a:ext>
-            </a:extLst>
-          </p:cNvPr>
-          <p:cNvSpPr>
-            <a:spLocks noGrp="1"/>
-          </p:cNvSpPr>
-          <p:nvPr>
-            <p:ph type="body" idx="1"/>
-          </p:nvPr>
-        </p:nvSpPr>
-        <p:spPr/>
-        <p:txBody>
-          <a:bodyPr/>
-          <a:lstStyle/>
-          <a:p>
+              <a:t>About Python</a:t>
+            </a:r>
+          </a:p>
+        </p:txBody>
+      </p:sp>
+      <p:sp>
+        <p:nvSpPr>
+          <p:cNvPr id="3" name="Content Placeholder 2"/>
+          <p:cNvSpPr>
+            <a:spLocks noGrp="1"/>
+          </p:cNvSpPr>
+          <p:nvPr>
+            <p:ph idx="1"/>
+          </p:nvPr>
+        </p:nvSpPr>
+        <p:spPr/>
+        <p:txBody>
+          <a:bodyPr/>
+          <a:lstStyle/>
+          <a:p>
+            <a:r>
+              <a:rPr lang="en-US" dirty="0"/>
+              <a:t>Developed by Guido van Rossum in the early 90s. Current versions: Python 3.7.x and Python 2.7.x</a:t>
+            </a:r>
+          </a:p>
+          <a:p>
+            <a:r>
+              <a:rPr lang="en-US" dirty="0"/>
+              <a:t>Python 3.7.x is van Rossum’s (and the larger community’s) attempt at fixing some core issues with python 2.x</a:t>
+            </a:r>
+          </a:p>
+          <a:p>
+            <a:pPr lvl="1"/>
+            <a:r>
+              <a:rPr lang="en-US" dirty="0"/>
+              <a:t>Integer division returns floats (5 / 2 = 2.5 instead of 5/2 = 2)</a:t>
+            </a:r>
+          </a:p>
+          <a:p>
+            <a:pPr lvl="1"/>
+            <a:r>
+              <a:rPr lang="en-US" dirty="0"/>
+              <a:t>Better handling of strings</a:t>
+            </a:r>
+          </a:p>
+          <a:p>
+            <a:pPr lvl="1"/>
+            <a:r>
+              <a:rPr lang="en-US" dirty="0"/>
+              <a:t>Better memory management in some cases</a:t>
+            </a:r>
+          </a:p>
+          <a:p>
+            <a:pPr lvl="1"/>
+            <a:r>
+              <a:rPr lang="en-US" dirty="0"/>
+              <a:t>It’s a bit faster in general: </a:t>
+            </a:r>
+            <a:r>
+              <a:rPr lang="en-US" dirty="0">
+                <a:hlinkClick r:id="rId2"/>
+              </a:rPr>
+              <a:t>https://hackernoon.com/which-is-the-fastest-version-of-python-2ae7c61a6b2b</a:t>
+            </a:r>
+            <a:endParaRPr lang="en-US" dirty="0"/>
+          </a:p>
+          <a:p>
+            <a:pPr marL="457200" lvl="1" indent="0">
+              <a:buNone/>
+            </a:pPr>
             <a:endParaRPr lang="en-US" dirty="0"/>
           </a:p>
         </p:txBody>
@@ -3789,7 +3842,7 @@
     </p:spTree>
     <p:extLst>
       <p:ext uri="{BB962C8B-B14F-4D97-AF65-F5344CB8AC3E}">
-        <p14:creationId xmlns:p14="http://schemas.microsoft.com/office/powerpoint/2010/main" val="2579184872"/>
+        <p14:creationId xmlns:p14="http://schemas.microsoft.com/office/powerpoint/2010/main" val="3428809214"/>
       </p:ext>
     </p:extLst>
   </p:cSld>
@@ -3833,6 +3886,207 @@
           <a:p>
             <a:r>
               <a:rPr lang="en-US" dirty="0"/>
+              <a:t>Pandas – Python Data Analysis Library</a:t>
+            </a:r>
+          </a:p>
+        </p:txBody>
+      </p:sp>
+      <p:pic>
+        <p:nvPicPr>
+          <p:cNvPr id="3" name="Picture 2"/>
+          <p:cNvPicPr>
+            <a:picLocks noChangeAspect="1"/>
+          </p:cNvPicPr>
+          <p:nvPr/>
+        </p:nvPicPr>
+        <p:blipFill rotWithShape="1">
+          <a:blip r:embed="rId2"/>
+          <a:srcRect l="3548"/>
+          <a:stretch/>
+        </p:blipFill>
+        <p:spPr>
+          <a:xfrm>
+            <a:off x="923544" y="1591056"/>
+            <a:ext cx="7291922" cy="4806505"/>
+          </a:xfrm>
+          <a:prstGeom prst="rect">
+            <a:avLst/>
+          </a:prstGeom>
+        </p:spPr>
+      </p:pic>
+      <p:sp>
+        <p:nvSpPr>
+          <p:cNvPr id="4" name="TextBox 3"/>
+          <p:cNvSpPr txBox="1"/>
+          <p:nvPr/>
+        </p:nvSpPr>
+        <p:spPr>
+          <a:xfrm>
+            <a:off x="8300810" y="1591056"/>
+            <a:ext cx="3447288" cy="369332"/>
+          </a:xfrm>
+          <a:prstGeom prst="rect">
+            <a:avLst/>
+          </a:prstGeom>
+          <a:noFill/>
+        </p:spPr>
+        <p:txBody>
+          <a:bodyPr wrap="square" rtlCol="0">
+            <a:spAutoFit/>
+          </a:bodyPr>
+          <a:lstStyle/>
+          <a:p>
+            <a:r>
+              <a:rPr lang="en-US" dirty="0">
+                <a:hlinkClick r:id="rId3"/>
+              </a:rPr>
+              <a:t>https://pandas.pydata.org/</a:t>
+            </a:r>
+            <a:r>
+              <a:rPr lang="en-US" dirty="0"/>
+              <a:t> </a:t>
+            </a:r>
+          </a:p>
+        </p:txBody>
+      </p:sp>
+    </p:spTree>
+    <p:extLst>
+      <p:ext uri="{BB962C8B-B14F-4D97-AF65-F5344CB8AC3E}">
+        <p14:creationId xmlns:p14="http://schemas.microsoft.com/office/powerpoint/2010/main" val="2298993283"/>
+      </p:ext>
+    </p:extLst>
+  </p:cSld>
+  <p:clrMapOvr>
+    <a:masterClrMapping/>
+  </p:clrMapOvr>
+</p:sld>
+</file>
+
+<file path=ppt/slides/slide14.xml><?xml version="1.0" encoding="utf-8"?>
+<p:sld xmlns:a="http://schemas.openxmlformats.org/drawingml/2006/main" xmlns:r="http://schemas.openxmlformats.org/officeDocument/2006/relationships" xmlns:p="http://schemas.openxmlformats.org/presentationml/2006/main">
+  <p:cSld>
+    <p:spTree>
+      <p:nvGrpSpPr>
+        <p:cNvPr id="1" name=""/>
+        <p:cNvGrpSpPr/>
+        <p:nvPr/>
+      </p:nvGrpSpPr>
+      <p:grpSpPr>
+        <a:xfrm>
+          <a:off x="0" y="0"/>
+          <a:ext cx="0" cy="0"/>
+          <a:chOff x="0" y="0"/>
+          <a:chExt cx="0" cy="0"/>
+        </a:xfrm>
+      </p:grpSpPr>
+      <p:sp>
+        <p:nvSpPr>
+          <p:cNvPr id="2" name="Title 1">
+            <a:extLst>
+              <a:ext uri="{FF2B5EF4-FFF2-40B4-BE49-F238E27FC236}">
+                <a16:creationId xmlns:a16="http://schemas.microsoft.com/office/drawing/2014/main" id="{12446907-52E0-49D5-B8B9-955CD4977F3D}"/>
+              </a:ext>
+            </a:extLst>
+          </p:cNvPr>
+          <p:cNvSpPr>
+            <a:spLocks noGrp="1"/>
+          </p:cNvSpPr>
+          <p:nvPr>
+            <p:ph type="title"/>
+          </p:nvPr>
+        </p:nvSpPr>
+        <p:spPr/>
+        <p:txBody>
+          <a:bodyPr/>
+          <a:lstStyle/>
+          <a:p>
+            <a:r>
+              <a:rPr lang="en-US" dirty="0"/>
+              <a:t>Using </a:t>
+            </a:r>
+            <a:r>
+              <a:rPr lang="en-US" dirty="0" err="1"/>
+              <a:t>Jupyter</a:t>
+            </a:r>
+            <a:r>
+              <a:rPr lang="en-US" dirty="0"/>
+              <a:t> on the Desktop</a:t>
+            </a:r>
+          </a:p>
+        </p:txBody>
+      </p:sp>
+      <p:sp>
+        <p:nvSpPr>
+          <p:cNvPr id="3" name="Text Placeholder 2">
+            <a:extLst>
+              <a:ext uri="{FF2B5EF4-FFF2-40B4-BE49-F238E27FC236}">
+                <a16:creationId xmlns:a16="http://schemas.microsoft.com/office/drawing/2014/main" id="{7101EC71-A9CD-4281-9AA0-06F74DD89E88}"/>
+              </a:ext>
+            </a:extLst>
+          </p:cNvPr>
+          <p:cNvSpPr>
+            <a:spLocks noGrp="1"/>
+          </p:cNvSpPr>
+          <p:nvPr>
+            <p:ph type="body" idx="1"/>
+          </p:nvPr>
+        </p:nvSpPr>
+        <p:spPr/>
+        <p:txBody>
+          <a:bodyPr/>
+          <a:lstStyle/>
+          <a:p>
+            <a:endParaRPr lang="en-US" dirty="0"/>
+          </a:p>
+        </p:txBody>
+      </p:sp>
+    </p:spTree>
+    <p:extLst>
+      <p:ext uri="{BB962C8B-B14F-4D97-AF65-F5344CB8AC3E}">
+        <p14:creationId xmlns:p14="http://schemas.microsoft.com/office/powerpoint/2010/main" val="2579184872"/>
+      </p:ext>
+    </p:extLst>
+  </p:cSld>
+  <p:clrMapOvr>
+    <a:masterClrMapping/>
+  </p:clrMapOvr>
+</p:sld>
+</file>
+
+<file path=ppt/slides/slide15.xml><?xml version="1.0" encoding="utf-8"?>
+<p:sld xmlns:a="http://schemas.openxmlformats.org/drawingml/2006/main" xmlns:r="http://schemas.openxmlformats.org/officeDocument/2006/relationships" xmlns:p="http://schemas.openxmlformats.org/presentationml/2006/main">
+  <p:cSld>
+    <p:spTree>
+      <p:nvGrpSpPr>
+        <p:cNvPr id="1" name=""/>
+        <p:cNvGrpSpPr/>
+        <p:nvPr/>
+      </p:nvGrpSpPr>
+      <p:grpSpPr>
+        <a:xfrm>
+          <a:off x="0" y="0"/>
+          <a:ext cx="0" cy="0"/>
+          <a:chOff x="0" y="0"/>
+          <a:chExt cx="0" cy="0"/>
+        </a:xfrm>
+      </p:grpSpPr>
+      <p:sp>
+        <p:nvSpPr>
+          <p:cNvPr id="2" name="Title 1"/>
+          <p:cNvSpPr>
+            <a:spLocks noGrp="1"/>
+          </p:cNvSpPr>
+          <p:nvPr>
+            <p:ph type="title"/>
+          </p:nvPr>
+        </p:nvSpPr>
+        <p:spPr/>
+        <p:txBody>
+          <a:bodyPr/>
+          <a:lstStyle/>
+          <a:p>
+            <a:r>
+              <a:rPr lang="en-US" dirty="0"/>
               <a:t>Anaconda and the Jupyter Notebook</a:t>
             </a:r>
           </a:p>
@@ -3923,7 +4177,7 @@
 </p:sld>
 </file>
 
-<file path=ppt/slides/slide14.xml><?xml version="1.0" encoding="utf-8"?>
+<file path=ppt/slides/slide16.xml><?xml version="1.0" encoding="utf-8"?>
 <p:sld xmlns:a="http://schemas.openxmlformats.org/drawingml/2006/main" xmlns:r="http://schemas.openxmlformats.org/officeDocument/2006/relationships" xmlns:p="http://schemas.openxmlformats.org/presentationml/2006/main">
   <p:cSld>
     <p:spTree>
@@ -3999,7 +4253,7 @@
 </p:sld>
 </file>
 
-<file path=ppt/slides/slide15.xml><?xml version="1.0" encoding="utf-8"?>
+<file path=ppt/slides/slide17.xml><?xml version="1.0" encoding="utf-8"?>
 <p:sld xmlns:a="http://schemas.openxmlformats.org/drawingml/2006/main" xmlns:r="http://schemas.openxmlformats.org/officeDocument/2006/relationships" xmlns:p="http://schemas.openxmlformats.org/presentationml/2006/main">
   <p:cSld>
     <p:spTree>
@@ -4081,135 +4335,7 @@
 </p:sld>
 </file>
 
-<file path=ppt/slides/slide16.xml><?xml version="1.0" encoding="utf-8"?>
-<p:sld xmlns:a="http://schemas.openxmlformats.org/drawingml/2006/main" xmlns:r="http://schemas.openxmlformats.org/officeDocument/2006/relationships" xmlns:p="http://schemas.openxmlformats.org/presentationml/2006/main">
-  <p:cSld>
-    <p:spTree>
-      <p:nvGrpSpPr>
-        <p:cNvPr id="1" name=""/>
-        <p:cNvGrpSpPr/>
-        <p:nvPr/>
-      </p:nvGrpSpPr>
-      <p:grpSpPr>
-        <a:xfrm>
-          <a:off x="0" y="0"/>
-          <a:ext cx="0" cy="0"/>
-          <a:chOff x="0" y="0"/>
-          <a:chExt cx="0" cy="0"/>
-        </a:xfrm>
-      </p:grpSpPr>
-      <p:sp>
-        <p:nvSpPr>
-          <p:cNvPr id="2" name="Title 1"/>
-          <p:cNvSpPr>
-            <a:spLocks noGrp="1"/>
-          </p:cNvSpPr>
-          <p:nvPr>
-            <p:ph type="title"/>
-          </p:nvPr>
-        </p:nvSpPr>
-        <p:spPr/>
-        <p:txBody>
-          <a:bodyPr/>
-          <a:lstStyle/>
-          <a:p>
-            <a:r>
-              <a:rPr lang="en-US" dirty="0"/>
-              <a:t>Activities</a:t>
-            </a:r>
-          </a:p>
-        </p:txBody>
-      </p:sp>
-      <p:sp>
-        <p:nvSpPr>
-          <p:cNvPr id="3" name="Content Placeholder 2"/>
-          <p:cNvSpPr>
-            <a:spLocks noGrp="1"/>
-          </p:cNvSpPr>
-          <p:nvPr>
-            <p:ph idx="1"/>
-          </p:nvPr>
-        </p:nvSpPr>
-        <p:spPr/>
-        <p:txBody>
-          <a:bodyPr/>
-          <a:lstStyle/>
-          <a:p>
-            <a:r>
-              <a:rPr lang="en-US" dirty="0"/>
-              <a:t>Part 1: Examine basic python syntax</a:t>
-            </a:r>
-          </a:p>
-          <a:p>
-            <a:pPr lvl="1"/>
-            <a:r>
-              <a:rPr lang="en-US" dirty="0"/>
-              <a:t>Strings and numbers!</a:t>
-            </a:r>
-          </a:p>
-          <a:p>
-            <a:r>
-              <a:rPr lang="en-US" dirty="0"/>
-              <a:t>Part 2: Find anagrams</a:t>
-            </a:r>
-          </a:p>
-          <a:p>
-            <a:pPr lvl="1"/>
-            <a:r>
-              <a:rPr lang="en-US" dirty="0"/>
-              <a:t>What words can we spell with the letters in the word ‘time’?</a:t>
-            </a:r>
-          </a:p>
-          <a:p>
-            <a:r>
-              <a:rPr lang="en-US" dirty="0"/>
-              <a:t>Part 3: Construct the all ages sex ratio</a:t>
-            </a:r>
-          </a:p>
-          <a:p>
-            <a:pPr lvl="1"/>
-            <a:r>
-              <a:rPr lang="en-US" dirty="0"/>
-              <a:t>Read in data pertaining to the age and sex of the population of Census Designated Places in Washington State during the 2013-2017 time period</a:t>
-            </a:r>
-          </a:p>
-          <a:p>
-            <a:pPr lvl="1"/>
-            <a:r>
-              <a:rPr lang="en-US" dirty="0"/>
-              <a:t>Compute the all ages sex-ratio (number of males per 100 females)</a:t>
-            </a:r>
-          </a:p>
-          <a:p>
-            <a:pPr lvl="1"/>
-            <a:r>
-              <a:rPr lang="en-US" dirty="0"/>
-              <a:t>Export the data to a .csv and an Excel workbook</a:t>
-            </a:r>
-          </a:p>
-          <a:p>
-            <a:pPr lvl="1"/>
-            <a:r>
-              <a:rPr lang="en-US" dirty="0"/>
-              <a:t>Merge the sex-ratio data with a shapefile for mapping in a GIS</a:t>
-            </a:r>
-          </a:p>
-        </p:txBody>
-      </p:sp>
-    </p:spTree>
-    <p:extLst>
-      <p:ext uri="{BB962C8B-B14F-4D97-AF65-F5344CB8AC3E}">
-        <p14:creationId xmlns:p14="http://schemas.microsoft.com/office/powerpoint/2010/main" val="3030563835"/>
-      </p:ext>
-    </p:extLst>
-  </p:cSld>
-  <p:clrMapOvr>
-    <a:masterClrMapping/>
-  </p:clrMapOvr>
-</p:sld>
-</file>
-
-<file path=ppt/slides/slide17.xml><?xml version="1.0" encoding="utf-8"?>
+<file path=ppt/slides/slide18.xml><?xml version="1.0" encoding="utf-8"?>
 <p:sld xmlns:a="http://schemas.openxmlformats.org/drawingml/2006/main" xmlns:r="http://schemas.openxmlformats.org/officeDocument/2006/relationships" xmlns:p="http://schemas.openxmlformats.org/presentationml/2006/main">
   <p:cSld>
     <p:spTree>
@@ -4306,112 +4432,6 @@
     <p:extLst>
       <p:ext uri="{BB962C8B-B14F-4D97-AF65-F5344CB8AC3E}">
         <p14:creationId xmlns:p14="http://schemas.microsoft.com/office/powerpoint/2010/main" val="3538109068"/>
-      </p:ext>
-    </p:extLst>
-  </p:cSld>
-  <p:clrMapOvr>
-    <a:masterClrMapping/>
-  </p:clrMapOvr>
-</p:sld>
-</file>
-
-<file path=ppt/slides/slide18.xml><?xml version="1.0" encoding="utf-8"?>
-<p:sld xmlns:a="http://schemas.openxmlformats.org/drawingml/2006/main" xmlns:r="http://schemas.openxmlformats.org/officeDocument/2006/relationships" xmlns:p="http://schemas.openxmlformats.org/presentationml/2006/main">
-  <p:cSld>
-    <p:spTree>
-      <p:nvGrpSpPr>
-        <p:cNvPr id="1" name=""/>
-        <p:cNvGrpSpPr/>
-        <p:nvPr/>
-      </p:nvGrpSpPr>
-      <p:grpSpPr>
-        <a:xfrm>
-          <a:off x="0" y="0"/>
-          <a:ext cx="0" cy="0"/>
-          <a:chOff x="0" y="0"/>
-          <a:chExt cx="0" cy="0"/>
-        </a:xfrm>
-      </p:grpSpPr>
-      <p:sp>
-        <p:nvSpPr>
-          <p:cNvPr id="2" name="Title 1"/>
-          <p:cNvSpPr>
-            <a:spLocks noGrp="1"/>
-          </p:cNvSpPr>
-          <p:nvPr>
-            <p:ph type="title"/>
-          </p:nvPr>
-        </p:nvSpPr>
-        <p:spPr/>
-        <p:txBody>
-          <a:bodyPr/>
-          <a:lstStyle/>
-          <a:p>
-            <a:r>
-              <a:rPr lang="en-US" dirty="0"/>
-              <a:t>Python in… PyCharm</a:t>
-            </a:r>
-          </a:p>
-        </p:txBody>
-      </p:sp>
-      <p:pic>
-        <p:nvPicPr>
-          <p:cNvPr id="4" name="Content Placeholder 3"/>
-          <p:cNvPicPr>
-            <a:picLocks noGrp="1" noChangeAspect="1"/>
-          </p:cNvPicPr>
-          <p:nvPr>
-            <p:ph idx="1"/>
-          </p:nvPr>
-        </p:nvPicPr>
-        <p:blipFill>
-          <a:blip r:embed="rId2"/>
-          <a:stretch>
-            <a:fillRect/>
-          </a:stretch>
-        </p:blipFill>
-        <p:spPr>
-          <a:xfrm>
-            <a:off x="2013632" y="1825625"/>
-            <a:ext cx="8164735" cy="4351338"/>
-          </a:xfrm>
-          <a:prstGeom prst="rect">
-            <a:avLst/>
-          </a:prstGeom>
-        </p:spPr>
-      </p:pic>
-      <p:sp>
-        <p:nvSpPr>
-          <p:cNvPr id="3" name="Rectangle 2"/>
-          <p:cNvSpPr/>
-          <p:nvPr/>
-        </p:nvSpPr>
-        <p:spPr>
-          <a:xfrm>
-            <a:off x="0" y="6488668"/>
-            <a:ext cx="3721468" cy="369332"/>
-          </a:xfrm>
-          <a:prstGeom prst="rect">
-            <a:avLst/>
-          </a:prstGeom>
-        </p:spPr>
-        <p:txBody>
-          <a:bodyPr wrap="none">
-            <a:spAutoFit/>
-          </a:bodyPr>
-          <a:lstStyle/>
-          <a:p>
-            <a:r>
-              <a:rPr lang="en-US" dirty="0"/>
-              <a:t>https://www.jetbrains.com/pycharm/</a:t>
-            </a:r>
-          </a:p>
-        </p:txBody>
-      </p:sp>
-    </p:spTree>
-    <p:extLst>
-      <p:ext uri="{BB962C8B-B14F-4D97-AF65-F5344CB8AC3E}">
-        <p14:creationId xmlns:p14="http://schemas.microsoft.com/office/powerpoint/2010/main" val="596040437"/>
       </p:ext>
     </p:extLst>
   </p:cSld>
@@ -4455,61 +4475,69 @@
           <a:p>
             <a:r>
               <a:rPr lang="en-US" dirty="0"/>
-              <a:t>Additional information on sex ratios</a:t>
-            </a:r>
-          </a:p>
-        </p:txBody>
-      </p:sp>
-      <p:sp>
-        <p:nvSpPr>
-          <p:cNvPr id="3" name="Content Placeholder 2"/>
-          <p:cNvSpPr>
-            <a:spLocks noGrp="1"/>
-          </p:cNvSpPr>
+              <a:t>Python in… PyCharm</a:t>
+            </a:r>
+          </a:p>
+        </p:txBody>
+      </p:sp>
+      <p:pic>
+        <p:nvPicPr>
+          <p:cNvPr id="4" name="Content Placeholder 3"/>
+          <p:cNvPicPr>
+            <a:picLocks noGrp="1" noChangeAspect="1"/>
+          </p:cNvPicPr>
           <p:nvPr>
             <p:ph idx="1"/>
           </p:nvPr>
-        </p:nvSpPr>
-        <p:spPr/>
-        <p:txBody>
-          <a:bodyPr/>
-          <a:lstStyle/>
-          <a:p>
-            <a:r>
-              <a:rPr lang="en-US" dirty="0">
-                <a:hlinkClick r:id="rId2"/>
-              </a:rPr>
-              <a:t>https://www.pnas.org/content/112/16/E2102</a:t>
-            </a:r>
-            <a:endParaRPr lang="en-US" dirty="0"/>
-          </a:p>
-          <a:p>
-            <a:r>
-              <a:rPr lang="en-US" dirty="0">
-                <a:hlinkClick r:id="rId3"/>
-              </a:rPr>
-              <a:t>https://www.populationpyramid.net/united-states-of-america/2017/</a:t>
-            </a:r>
-            <a:endParaRPr lang="en-US" dirty="0"/>
-          </a:p>
-          <a:p>
-            <a:r>
-              <a:rPr lang="en-US" dirty="0">
-                <a:hlinkClick r:id="rId4"/>
-              </a:rPr>
-              <a:t>http://science.sciencemag.org/content/297/5589/2008</a:t>
-            </a:r>
-            <a:endParaRPr lang="en-US" dirty="0"/>
-          </a:p>
-          <a:p>
-            <a:endParaRPr lang="en-US" dirty="0"/>
+        </p:nvPicPr>
+        <p:blipFill>
+          <a:blip r:embed="rId2"/>
+          <a:stretch>
+            <a:fillRect/>
+          </a:stretch>
+        </p:blipFill>
+        <p:spPr>
+          <a:xfrm>
+            <a:off x="2013632" y="1825625"/>
+            <a:ext cx="8164735" cy="4351338"/>
+          </a:xfrm>
+          <a:prstGeom prst="rect">
+            <a:avLst/>
+          </a:prstGeom>
+        </p:spPr>
+      </p:pic>
+      <p:sp>
+        <p:nvSpPr>
+          <p:cNvPr id="3" name="Rectangle 2"/>
+          <p:cNvSpPr/>
+          <p:nvPr/>
+        </p:nvSpPr>
+        <p:spPr>
+          <a:xfrm>
+            <a:off x="0" y="6488668"/>
+            <a:ext cx="3721468" cy="369332"/>
+          </a:xfrm>
+          <a:prstGeom prst="rect">
+            <a:avLst/>
+          </a:prstGeom>
+        </p:spPr>
+        <p:txBody>
+          <a:bodyPr wrap="none">
+            <a:spAutoFit/>
+          </a:bodyPr>
+          <a:lstStyle/>
+          <a:p>
+            <a:r>
+              <a:rPr lang="en-US" dirty="0"/>
+              <a:t>https://www.jetbrains.com/pycharm/</a:t>
+            </a:r>
           </a:p>
         </p:txBody>
       </p:sp>
     </p:spTree>
     <p:extLst>
       <p:ext uri="{BB962C8B-B14F-4D97-AF65-F5344CB8AC3E}">
-        <p14:creationId xmlns:p14="http://schemas.microsoft.com/office/powerpoint/2010/main" val="882710562"/>
+        <p14:creationId xmlns:p14="http://schemas.microsoft.com/office/powerpoint/2010/main" val="596040437"/>
       </p:ext>
     </p:extLst>
   </p:cSld>
@@ -4685,6 +4713,104 @@
           <a:p>
             <a:r>
               <a:rPr lang="en-US" dirty="0"/>
+              <a:t>Additional information on sex ratios</a:t>
+            </a:r>
+          </a:p>
+        </p:txBody>
+      </p:sp>
+      <p:sp>
+        <p:nvSpPr>
+          <p:cNvPr id="3" name="Content Placeholder 2"/>
+          <p:cNvSpPr>
+            <a:spLocks noGrp="1"/>
+          </p:cNvSpPr>
+          <p:nvPr>
+            <p:ph idx="1"/>
+          </p:nvPr>
+        </p:nvSpPr>
+        <p:spPr/>
+        <p:txBody>
+          <a:bodyPr/>
+          <a:lstStyle/>
+          <a:p>
+            <a:r>
+              <a:rPr lang="en-US" dirty="0">
+                <a:hlinkClick r:id="rId2"/>
+              </a:rPr>
+              <a:t>https://www.pnas.org/content/112/16/E2102</a:t>
+            </a:r>
+            <a:endParaRPr lang="en-US" dirty="0"/>
+          </a:p>
+          <a:p>
+            <a:r>
+              <a:rPr lang="en-US" dirty="0">
+                <a:hlinkClick r:id="rId3"/>
+              </a:rPr>
+              <a:t>https://www.populationpyramid.net/united-states-of-america/2017/</a:t>
+            </a:r>
+            <a:endParaRPr lang="en-US" dirty="0"/>
+          </a:p>
+          <a:p>
+            <a:r>
+              <a:rPr lang="en-US" dirty="0">
+                <a:hlinkClick r:id="rId4"/>
+              </a:rPr>
+              <a:t>http://science.sciencemag.org/content/297/5589/2008</a:t>
+            </a:r>
+            <a:endParaRPr lang="en-US" dirty="0"/>
+          </a:p>
+          <a:p>
+            <a:endParaRPr lang="en-US" dirty="0"/>
+          </a:p>
+        </p:txBody>
+      </p:sp>
+    </p:spTree>
+    <p:extLst>
+      <p:ext uri="{BB962C8B-B14F-4D97-AF65-F5344CB8AC3E}">
+        <p14:creationId xmlns:p14="http://schemas.microsoft.com/office/powerpoint/2010/main" val="882710562"/>
+      </p:ext>
+    </p:extLst>
+  </p:cSld>
+  <p:clrMapOvr>
+    <a:masterClrMapping/>
+  </p:clrMapOvr>
+</p:sld>
+</file>
+
+<file path=ppt/slides/slide21.xml><?xml version="1.0" encoding="utf-8"?>
+<p:sld xmlns:a="http://schemas.openxmlformats.org/drawingml/2006/main" xmlns:r="http://schemas.openxmlformats.org/officeDocument/2006/relationships" xmlns:p="http://schemas.openxmlformats.org/presentationml/2006/main">
+  <p:cSld>
+    <p:spTree>
+      <p:nvGrpSpPr>
+        <p:cNvPr id="1" name=""/>
+        <p:cNvGrpSpPr/>
+        <p:nvPr/>
+      </p:nvGrpSpPr>
+      <p:grpSpPr>
+        <a:xfrm>
+          <a:off x="0" y="0"/>
+          <a:ext cx="0" cy="0"/>
+          <a:chOff x="0" y="0"/>
+          <a:chExt cx="0" cy="0"/>
+        </a:xfrm>
+      </p:grpSpPr>
+      <p:sp>
+        <p:nvSpPr>
+          <p:cNvPr id="2" name="Title 1"/>
+          <p:cNvSpPr>
+            <a:spLocks noGrp="1"/>
+          </p:cNvSpPr>
+          <p:nvPr>
+            <p:ph type="title"/>
+          </p:nvPr>
+        </p:nvSpPr>
+        <p:spPr/>
+        <p:txBody>
+          <a:bodyPr/>
+          <a:lstStyle/>
+          <a:p>
+            <a:r>
+              <a:rPr lang="en-US" dirty="0"/>
               <a:t>Data Sources</a:t>
             </a:r>
           </a:p>
@@ -4754,7 +4880,7 @@
 </p:sld>
 </file>
 
-<file path=ppt/slides/slide21.xml><?xml version="1.0" encoding="utf-8"?>
+<file path=ppt/slides/slide22.xml><?xml version="1.0" encoding="utf-8"?>
 <p:sld xmlns:a="http://schemas.openxmlformats.org/drawingml/2006/main" xmlns:r="http://schemas.openxmlformats.org/officeDocument/2006/relationships" xmlns:p="http://schemas.openxmlformats.org/presentationml/2006/main">
   <p:cSld>
     <p:spTree>
@@ -5557,13 +5683,7 @@
       </p:grpSpPr>
       <p:sp>
         <p:nvSpPr>
-          <p:cNvPr id="4" name="Title 3">
-            <a:extLst>
-              <a:ext uri="{FF2B5EF4-FFF2-40B4-BE49-F238E27FC236}">
-                <a16:creationId xmlns:a16="http://schemas.microsoft.com/office/drawing/2014/main" id="{05A97637-9CEC-4111-86FC-9B81BD1CB508}"/>
-              </a:ext>
-            </a:extLst>
-          </p:cNvPr>
+          <p:cNvPr id="2" name="Title 1"/>
           <p:cNvSpPr>
             <a:spLocks noGrp="1"/>
           </p:cNvSpPr>
@@ -5578,40 +5698,91 @@
           <a:p>
             <a:r>
               <a:rPr lang="en-US" dirty="0"/>
-              <a:t>Python and Workshop Information</a:t>
-            </a:r>
-          </a:p>
-        </p:txBody>
-      </p:sp>
-      <p:sp>
-        <p:nvSpPr>
-          <p:cNvPr id="5" name="Text Placeholder 4">
-            <a:extLst>
-              <a:ext uri="{FF2B5EF4-FFF2-40B4-BE49-F238E27FC236}">
-                <a16:creationId xmlns:a16="http://schemas.microsoft.com/office/drawing/2014/main" id="{65C3CD85-523D-412C-A211-656CC3C9964E}"/>
-              </a:ext>
-            </a:extLst>
-          </p:cNvPr>
-          <p:cNvSpPr>
-            <a:spLocks noGrp="1"/>
-          </p:cNvSpPr>
-          <p:nvPr>
-            <p:ph type="body" idx="1"/>
-          </p:nvPr>
-        </p:nvSpPr>
-        <p:spPr/>
-        <p:txBody>
-          <a:bodyPr/>
-          <a:lstStyle/>
-          <a:p>
-            <a:endParaRPr lang="en-US"/>
+              <a:t>Activities</a:t>
+            </a:r>
+          </a:p>
+        </p:txBody>
+      </p:sp>
+      <p:sp>
+        <p:nvSpPr>
+          <p:cNvPr id="3" name="Content Placeholder 2"/>
+          <p:cNvSpPr>
+            <a:spLocks noGrp="1"/>
+          </p:cNvSpPr>
+          <p:nvPr>
+            <p:ph idx="1"/>
+          </p:nvPr>
+        </p:nvSpPr>
+        <p:spPr/>
+        <p:txBody>
+          <a:bodyPr/>
+          <a:lstStyle/>
+          <a:p>
+            <a:r>
+              <a:rPr lang="en-US" dirty="0"/>
+              <a:t>Part 1: Examine basic python syntax</a:t>
+            </a:r>
+          </a:p>
+          <a:p>
+            <a:pPr lvl="1"/>
+            <a:r>
+              <a:rPr lang="en-US" dirty="0"/>
+              <a:t>Strings and numbers!</a:t>
+            </a:r>
+          </a:p>
+          <a:p>
+            <a:r>
+              <a:rPr lang="en-US" dirty="0"/>
+              <a:t>Part 2: Find anagrams</a:t>
+            </a:r>
+          </a:p>
+          <a:p>
+            <a:pPr lvl="1"/>
+            <a:r>
+              <a:rPr lang="en-US" dirty="0"/>
+              <a:t>What words can we spell with the letters in the word ‘time’?</a:t>
+            </a:r>
+          </a:p>
+          <a:p>
+            <a:r>
+              <a:rPr lang="en-US" dirty="0"/>
+              <a:t>Part 3: Construct the all ages sex ratio</a:t>
+            </a:r>
+          </a:p>
+          <a:p>
+            <a:pPr lvl="1"/>
+            <a:r>
+              <a:rPr lang="en-US" dirty="0"/>
+              <a:t>Read in data pertaining to the age and sex of the population of Census Designated Places in Washington State during the 2013-2017 time period</a:t>
+            </a:r>
+          </a:p>
+          <a:p>
+            <a:pPr lvl="1"/>
+            <a:r>
+              <a:rPr lang="en-US" dirty="0"/>
+              <a:t>Compute the all ages sex-ratio (number of males per 100 females)</a:t>
+            </a:r>
+          </a:p>
+          <a:p>
+            <a:pPr lvl="1"/>
+            <a:r>
+              <a:rPr lang="en-US" dirty="0"/>
+              <a:t>Export the data to a .csv and an Excel workbook</a:t>
+            </a:r>
+          </a:p>
+          <a:p>
+            <a:pPr lvl="1"/>
+            <a:r>
+              <a:rPr lang="en-US" dirty="0"/>
+              <a:t>Merge the sex-ratio data with a shapefile for mapping in a GIS</a:t>
+            </a:r>
           </a:p>
         </p:txBody>
       </p:sp>
     </p:spTree>
     <p:extLst>
       <p:ext uri="{BB962C8B-B14F-4D97-AF65-F5344CB8AC3E}">
-        <p14:creationId xmlns:p14="http://schemas.microsoft.com/office/powerpoint/2010/main" val="2746606654"/>
+        <p14:creationId xmlns:p14="http://schemas.microsoft.com/office/powerpoint/2010/main" val="3030563835"/>
       </p:ext>
     </p:extLst>
   </p:cSld>
@@ -5640,7 +5811,13 @@
       </p:grpSpPr>
       <p:sp>
         <p:nvSpPr>
-          <p:cNvPr id="2" name="Title 1"/>
+          <p:cNvPr id="2" name="Title 1">
+            <a:extLst>
+              <a:ext uri="{FF2B5EF4-FFF2-40B4-BE49-F238E27FC236}">
+                <a16:creationId xmlns:a16="http://schemas.microsoft.com/office/drawing/2014/main" id="{E8BD0BD0-CFD5-4E64-803F-ADFF570B3B05}"/>
+              </a:ext>
+            </a:extLst>
+          </p:cNvPr>
           <p:cNvSpPr>
             <a:spLocks noGrp="1"/>
           </p:cNvSpPr>
@@ -5648,140 +5825,59 @@
             <p:ph type="title"/>
           </p:nvPr>
         </p:nvSpPr>
-        <p:spPr/>
-        <p:txBody>
-          <a:bodyPr/>
-          <a:lstStyle/>
-          <a:p>
-            <a:r>
-              <a:rPr lang="en-US" dirty="0"/>
-              <a:t>Why python?</a:t>
-            </a:r>
-          </a:p>
-        </p:txBody>
-      </p:sp>
-      <p:sp>
-        <p:nvSpPr>
-          <p:cNvPr id="3" name="Content Placeholder 2"/>
-          <p:cNvSpPr>
-            <a:spLocks noGrp="1"/>
-          </p:cNvSpPr>
-          <p:nvPr>
-            <p:ph idx="1"/>
-          </p:nvPr>
-        </p:nvSpPr>
-        <p:spPr/>
+        <p:spPr>
+          <a:xfrm>
+            <a:off x="838200" y="-9337"/>
+            <a:ext cx="10515600" cy="1106623"/>
+          </a:xfrm>
+        </p:spPr>
         <p:txBody>
           <a:bodyPr>
-            <a:normAutofit fontScale="92500" lnSpcReduction="20000"/>
+            <a:normAutofit/>
           </a:bodyPr>
           <a:lstStyle/>
           <a:p>
-            <a:pPr>
-              <a:buFont typeface="Arial" panose="020B0604020202020204" pitchFamily="34" charset="0"/>
-              <a:buChar char="•"/>
-            </a:pPr>
-            <a:r>
-              <a:rPr lang="en-US" dirty="0"/>
-              <a:t>It’s easy to jump in: </a:t>
-            </a:r>
-            <a:r>
-              <a:rPr lang="en-US" dirty="0">
-                <a:hlinkClick r:id="rId2"/>
-              </a:rPr>
-              <a:t>https://www.python.org/about/gettingstarted/</a:t>
-            </a:r>
-            <a:endParaRPr lang="en-US" dirty="0"/>
-          </a:p>
-          <a:p>
-            <a:pPr>
-              <a:buFont typeface="Arial" panose="020B0604020202020204" pitchFamily="34" charset="0"/>
-              <a:buChar char="•"/>
-            </a:pPr>
-            <a:r>
-              <a:rPr lang="en-US" dirty="0"/>
-              <a:t>It’s cross-platform: Windows, Mac, Linux</a:t>
-            </a:r>
-          </a:p>
-          <a:p>
-            <a:pPr>
-              <a:buFont typeface="Arial" panose="020B0604020202020204" pitchFamily="34" charset="0"/>
-              <a:buChar char="•"/>
-            </a:pPr>
-            <a:r>
-              <a:rPr lang="en-US" dirty="0"/>
-              <a:t>It was designed to be simple and readable: </a:t>
-            </a:r>
-            <a:r>
-              <a:rPr lang="en-US" dirty="0">
-                <a:hlinkClick r:id="rId3"/>
-              </a:rPr>
-              <a:t>https://xkcd.com/353/</a:t>
-            </a:r>
-            <a:endParaRPr lang="en-US" dirty="0"/>
-          </a:p>
-          <a:p>
-            <a:r>
-              <a:rPr lang="en-US" dirty="0"/>
-              <a:t>It’s free and open source</a:t>
-            </a:r>
-          </a:p>
-          <a:p>
-            <a:r>
-              <a:rPr lang="en-US" dirty="0"/>
-              <a:t>It’s popular: </a:t>
-            </a:r>
-            <a:r>
-              <a:rPr lang="en-US" dirty="0">
-                <a:hlinkClick r:id="rId4"/>
-              </a:rPr>
-              <a:t>https://www.tiobe.com/tiobe-index/python/</a:t>
-            </a:r>
-            <a:endParaRPr lang="en-US" dirty="0"/>
-          </a:p>
-          <a:p>
-            <a:pPr>
-              <a:buFont typeface="Arial" panose="020B0604020202020204" pitchFamily="34" charset="0"/>
-              <a:buChar char="•"/>
-            </a:pPr>
-            <a:r>
-              <a:rPr lang="en-US" dirty="0"/>
-              <a:t>It’s prolific: used in many industries for many jobs. Finance, real estate tech, server administration, health care research, non-profit administration</a:t>
-            </a:r>
-          </a:p>
-          <a:p>
-            <a:pPr>
-              <a:buFont typeface="Arial" panose="020B0604020202020204" pitchFamily="34" charset="0"/>
-              <a:buChar char="•"/>
-            </a:pPr>
-            <a:r>
-              <a:rPr lang="en-US" dirty="0"/>
-              <a:t>And departments across campus: sociology, economics, civil engineering, astronomy (and geography!)</a:t>
-            </a:r>
-          </a:p>
-          <a:p>
-            <a:pPr>
-              <a:buFont typeface="Arial" panose="020B0604020202020204" pitchFamily="34" charset="0"/>
-              <a:buChar char="•"/>
-            </a:pPr>
-            <a:r>
-              <a:rPr lang="en-US" dirty="0"/>
-              <a:t>Many libraries that do pretty much what you want with just a few commands</a:t>
-            </a:r>
-          </a:p>
-          <a:p>
-            <a:pPr>
-              <a:buFont typeface="Arial" panose="020B0604020202020204" pitchFamily="34" charset="0"/>
-              <a:buChar char="•"/>
-            </a:pPr>
-            <a:endParaRPr lang="en-US" dirty="0"/>
-          </a:p>
-        </p:txBody>
-      </p:sp>
+            <a:r>
+              <a:rPr lang="en-US" sz="4000" dirty="0"/>
+              <a:t>Saving a notebook to your google drive</a:t>
+            </a:r>
+          </a:p>
+        </p:txBody>
+      </p:sp>
+      <p:pic>
+        <p:nvPicPr>
+          <p:cNvPr id="5" name="Picture 4">
+            <a:extLst>
+              <a:ext uri="{FF2B5EF4-FFF2-40B4-BE49-F238E27FC236}">
+                <a16:creationId xmlns:a16="http://schemas.microsoft.com/office/drawing/2014/main" id="{82CF6021-9A1D-4DE4-B6DD-989427B272B1}"/>
+              </a:ext>
+            </a:extLst>
+          </p:cNvPr>
+          <p:cNvPicPr>
+            <a:picLocks noChangeAspect="1"/>
+          </p:cNvPicPr>
+          <p:nvPr/>
+        </p:nvPicPr>
+        <p:blipFill>
+          <a:blip r:embed="rId2"/>
+          <a:stretch>
+            <a:fillRect/>
+          </a:stretch>
+        </p:blipFill>
+        <p:spPr>
+          <a:xfrm>
+            <a:off x="783771" y="993503"/>
+            <a:ext cx="10624457" cy="5754914"/>
+          </a:xfrm>
+          <a:prstGeom prst="rect">
+            <a:avLst/>
+          </a:prstGeom>
+        </p:spPr>
+      </p:pic>
     </p:spTree>
     <p:extLst>
       <p:ext uri="{BB962C8B-B14F-4D97-AF65-F5344CB8AC3E}">
-        <p14:creationId xmlns:p14="http://schemas.microsoft.com/office/powerpoint/2010/main" val="3321498620"/>
+        <p14:creationId xmlns:p14="http://schemas.microsoft.com/office/powerpoint/2010/main" val="3535670437"/>
       </p:ext>
     </p:extLst>
   </p:cSld>

</xml_diff>